<commit_message>
Up source + tutorial Code first, database first
</commit_message>
<xml_diff>
--- a/DOCUMENT/Group7-Slide.pptx
+++ b/DOCUMENT/Group7-Slide.pptx
@@ -5,10 +5,10 @@
     <p:sldMasterId id="2147483660" r:id="rId1"/>
   </p:sldMasterIdLst>
   <p:notesMasterIdLst>
-    <p:notesMasterId r:id="rId15"/>
+    <p:notesMasterId r:id="rId17"/>
   </p:notesMasterIdLst>
   <p:handoutMasterIdLst>
-    <p:handoutMasterId r:id="rId16"/>
+    <p:handoutMasterId r:id="rId18"/>
   </p:handoutMasterIdLst>
   <p:sldIdLst>
     <p:sldId id="256" r:id="rId2"/>
@@ -22,8 +22,10 @@
     <p:sldId id="289" r:id="rId10"/>
     <p:sldId id="291" r:id="rId11"/>
     <p:sldId id="264" r:id="rId12"/>
-    <p:sldId id="293" r:id="rId13"/>
-    <p:sldId id="294" r:id="rId14"/>
+    <p:sldId id="296" r:id="rId13"/>
+    <p:sldId id="293" r:id="rId14"/>
+    <p:sldId id="295" r:id="rId15"/>
+    <p:sldId id="294" r:id="rId16"/>
   </p:sldIdLst>
   <p:sldSz cx="9144000" cy="5143500" type="screen16x9"/>
   <p:notesSz cx="6858000" cy="9144000"/>
@@ -244,6 +246,9 @@
         </p15:guide>
       </p15:sldGuideLst>
     </p:ext>
+    <p:ext uri="{2D200454-40CA-4A62-9FC3-DE9A4176ACB9}">
+      <p15:notesGuideLst xmlns:p15="http://schemas.microsoft.com/office/powerpoint/2012/main"/>
+    </p:ext>
   </p:extLst>
 </p:presentation>
 </file>
@@ -330,7 +335,7 @@
           <a:p>
             <a:fld id="{0587ED61-A483-4AE7-A603-5FF7BB0F5798}" type="datetimeFigureOut">
               <a:rPr lang="vi-VN" smtClean="0"/>
-              <a:t>17/03/2017</a:t>
+              <a:t>25/03/2017</a:t>
             </a:fld>
             <a:endParaRPr lang="vi-VN"/>
           </a:p>
@@ -871,12 +876,16 @@
               <a:buNone/>
             </a:pPr>
             <a:r>
-              <a:rPr lang="vi-VN" smtClean="0"/>
-              <a:t>POCO</a:t>
-            </a:r>
-            <a:r>
-              <a:rPr lang="vi-VN" baseline="0" smtClean="0"/>
-              <a:t> class???</a:t>
+              <a:rPr lang="vi-VN" sz="1100" b="0" i="0" kern="1200" smtClean="0">
+                <a:solidFill>
+                  <a:schemeClr val="tx1"/>
+                </a:solidFill>
+                <a:effectLst/>
+                <a:latin typeface="+mn-lt"/>
+                <a:ea typeface="+mn-ea"/>
+                <a:cs typeface="+mn-cs"/>
+              </a:rPr>
+              <a:t>POCO là lớp chỉ sử dụng các kiểu dữ liệu tiêu chuẩn.</a:t>
             </a:r>
             <a:endParaRPr/>
           </a:p>
@@ -984,6 +993,102 @@
               </a:spcBef>
               <a:buNone/>
             </a:pPr>
+            <a:r>
+              <a:rPr lang="vi-VN" sz="1100" b="1" i="0" kern="1200" smtClean="0">
+                <a:solidFill>
+                  <a:schemeClr val="tx1"/>
+                </a:solidFill>
+                <a:effectLst/>
+                <a:latin typeface="+mn-lt"/>
+                <a:ea typeface="+mn-ea"/>
+                <a:cs typeface="+mn-cs"/>
+              </a:rPr>
+              <a:t>DBContext</a:t>
+            </a:r>
+            <a:r>
+              <a:rPr lang="vi-VN" sz="1100" b="0" i="0" kern="1200" smtClean="0">
+                <a:solidFill>
+                  <a:schemeClr val="tx1"/>
+                </a:solidFill>
+                <a:effectLst/>
+                <a:latin typeface="+mn-lt"/>
+                <a:ea typeface="+mn-ea"/>
+                <a:cs typeface="+mn-cs"/>
+              </a:rPr>
+              <a:t> là</a:t>
+            </a:r>
+            <a:r>
+              <a:rPr lang="vi-VN" sz="1100" b="0" i="0" kern="1200" baseline="0" smtClean="0">
+                <a:solidFill>
+                  <a:schemeClr val="tx1"/>
+                </a:solidFill>
+                <a:effectLst/>
+                <a:latin typeface="+mn-lt"/>
+                <a:ea typeface="+mn-ea"/>
+                <a:cs typeface="+mn-cs"/>
+              </a:rPr>
+              <a:t> l</a:t>
+            </a:r>
+            <a:r>
+              <a:rPr lang="vi-VN" sz="1100" b="0" i="0" kern="1200" smtClean="0">
+                <a:solidFill>
+                  <a:schemeClr val="tx1"/>
+                </a:solidFill>
+                <a:effectLst/>
+                <a:latin typeface="+mn-lt"/>
+                <a:ea typeface="+mn-ea"/>
+                <a:cs typeface="+mn-cs"/>
+              </a:rPr>
+              <a:t>ớp định nghĩa (class context). Là</a:t>
+            </a:r>
+            <a:r>
+              <a:rPr lang="vi-VN" sz="1100" b="0" i="0" kern="1200" baseline="0" smtClean="0">
+                <a:solidFill>
+                  <a:schemeClr val="tx1"/>
+                </a:solidFill>
+                <a:effectLst/>
+                <a:latin typeface="+mn-lt"/>
+                <a:ea typeface="+mn-ea"/>
+                <a:cs typeface="+mn-cs"/>
+              </a:rPr>
+              <a:t> </a:t>
+            </a:r>
+            <a:r>
+              <a:rPr lang="vi-VN" sz="1100" b="0" i="0" kern="1200" smtClean="0">
+                <a:solidFill>
+                  <a:schemeClr val="tx1"/>
+                </a:solidFill>
+                <a:effectLst/>
+                <a:latin typeface="+mn-lt"/>
+                <a:ea typeface="+mn-ea"/>
+                <a:cs typeface="+mn-cs"/>
+              </a:rPr>
+              <a:t>cầu nối giữa các lớp </a:t>
+            </a:r>
+            <a:r>
+              <a:rPr lang="vi-VN" sz="1100" b="0" i="0" kern="1200" smtClean="0">
+                <a:solidFill>
+                  <a:schemeClr val="tx1"/>
+                </a:solidFill>
+                <a:effectLst/>
+                <a:latin typeface="+mn-lt"/>
+                <a:ea typeface="+mn-ea"/>
+                <a:cs typeface="+mn-cs"/>
+              </a:rPr>
+              <a:t>hoặc </a:t>
+            </a:r>
+            <a:r>
+              <a:rPr lang="vi-VN" sz="1100" b="0" i="0" kern="1200" smtClean="0">
+                <a:solidFill>
+                  <a:schemeClr val="tx1"/>
+                </a:solidFill>
+                <a:effectLst/>
+                <a:latin typeface="+mn-lt"/>
+                <a:ea typeface="+mn-ea"/>
+                <a:cs typeface="+mn-cs"/>
+              </a:rPr>
+              <a:t>thực thể với cơ sở dữ liệu.</a:t>
+            </a:r>
             <a:endParaRPr/>
           </a:p>
         </p:txBody>
@@ -1002,6 +1107,112 @@
 </file>
 
 <file path=ppt/notesSlides/notesSlide12.xml><?xml version="1.0" encoding="utf-8"?>
+<p:notes xmlns:a="http://schemas.openxmlformats.org/drawingml/2006/main" xmlns:r="http://schemas.openxmlformats.org/officeDocument/2006/relationships" xmlns:p="http://schemas.openxmlformats.org/presentationml/2006/main" showMasterSp="0" showMasterPhAnim="0">
+  <p:cSld>
+    <p:spTree>
+      <p:nvGrpSpPr>
+        <p:cNvPr id="1" name="Shape 142"/>
+        <p:cNvGrpSpPr/>
+        <p:nvPr/>
+      </p:nvGrpSpPr>
+      <p:grpSpPr>
+        <a:xfrm>
+          <a:off x="0" y="0"/>
+          <a:ext cx="0" cy="0"/>
+          <a:chOff x="0" y="0"/>
+          <a:chExt cx="0" cy="0"/>
+        </a:xfrm>
+      </p:grpSpPr>
+      <p:sp>
+        <p:nvSpPr>
+          <p:cNvPr id="143" name="Shape 143"/>
+          <p:cNvSpPr>
+            <a:spLocks noGrp="1" noRot="1" noChangeAspect="1"/>
+          </p:cNvSpPr>
+          <p:nvPr>
+            <p:ph type="sldImg" idx="2"/>
+          </p:nvPr>
+        </p:nvSpPr>
+        <p:spPr>
+          <a:xfrm>
+            <a:off x="381000" y="685800"/>
+            <a:ext cx="6096000" cy="3429000"/>
+          </a:xfrm>
+          <a:custGeom>
+            <a:avLst/>
+            <a:gdLst/>
+            <a:ahLst/>
+            <a:cxnLst/>
+            <a:rect l="0" t="0" r="0" b="0"/>
+            <a:pathLst>
+              <a:path w="120000" h="120000" extrusionOk="0">
+                <a:moveTo>
+                  <a:pt x="0" y="0"/>
+                </a:moveTo>
+                <a:lnTo>
+                  <a:pt x="120000" y="0"/>
+                </a:lnTo>
+                <a:lnTo>
+                  <a:pt x="120000" y="120000"/>
+                </a:lnTo>
+                <a:lnTo>
+                  <a:pt x="0" y="120000"/>
+                </a:lnTo>
+                <a:close/>
+              </a:path>
+            </a:pathLst>
+          </a:custGeom>
+        </p:spPr>
+      </p:sp>
+      <p:sp>
+        <p:nvSpPr>
+          <p:cNvPr id="144" name="Shape 144"/>
+          <p:cNvSpPr txBox="1">
+            <a:spLocks noGrp="1"/>
+          </p:cNvSpPr>
+          <p:nvPr>
+            <p:ph type="body" idx="1"/>
+          </p:nvPr>
+        </p:nvSpPr>
+        <p:spPr>
+          <a:xfrm>
+            <a:off x="685800" y="4343400"/>
+            <a:ext cx="5486399" cy="4114800"/>
+          </a:xfrm>
+          <a:prstGeom prst="rect">
+            <a:avLst/>
+          </a:prstGeom>
+        </p:spPr>
+        <p:txBody>
+          <a:bodyPr lIns="91425" tIns="91425" rIns="91425" bIns="91425" anchor="t" anchorCtr="0">
+            <a:noAutofit/>
+          </a:bodyPr>
+          <a:lstStyle/>
+          <a:p>
+            <a:pPr lvl="0">
+              <a:spcBef>
+                <a:spcPts val="0"/>
+              </a:spcBef>
+              <a:buNone/>
+            </a:pPr>
+            <a:endParaRPr/>
+          </a:p>
+        </p:txBody>
+      </p:sp>
+    </p:spTree>
+    <p:extLst>
+      <p:ext uri="{BB962C8B-B14F-4D97-AF65-F5344CB8AC3E}">
+        <p14:creationId xmlns:p14="http://schemas.microsoft.com/office/powerpoint/2010/main" val="1343792302"/>
+      </p:ext>
+    </p:extLst>
+  </p:cSld>
+  <p:clrMapOvr>
+    <a:masterClrMapping/>
+  </p:clrMapOvr>
+</p:notes>
+</file>
+
+<file path=ppt/notesSlides/notesSlide13.xml><?xml version="1.0" encoding="utf-8"?>
 <p:notes xmlns:a="http://schemas.openxmlformats.org/drawingml/2006/main" xmlns:r="http://schemas.openxmlformats.org/officeDocument/2006/relationships" xmlns:p="http://schemas.openxmlformats.org/presentationml/2006/main" showMasterSp="0" showMasterPhAnim="0">
   <p:cSld>
     <p:spTree>
@@ -1107,7 +1318,386 @@
 </p:notes>
 </file>
 
-<file path=ppt/notesSlides/notesSlide13.xml><?xml version="1.0" encoding="utf-8"?>
+<file path=ppt/notesSlides/notesSlide14.xml><?xml version="1.0" encoding="utf-8"?>
+<p:notes xmlns:a="http://schemas.openxmlformats.org/drawingml/2006/main" xmlns:r="http://schemas.openxmlformats.org/officeDocument/2006/relationships" xmlns:p="http://schemas.openxmlformats.org/presentationml/2006/main" showMasterSp="0" showMasterPhAnim="0">
+  <p:cSld>
+    <p:spTree>
+      <p:nvGrpSpPr>
+        <p:cNvPr id="1" name="Shape 119"/>
+        <p:cNvGrpSpPr/>
+        <p:nvPr/>
+      </p:nvGrpSpPr>
+      <p:grpSpPr>
+        <a:xfrm>
+          <a:off x="0" y="0"/>
+          <a:ext cx="0" cy="0"/>
+          <a:chOff x="0" y="0"/>
+          <a:chExt cx="0" cy="0"/>
+        </a:xfrm>
+      </p:grpSpPr>
+      <p:sp>
+        <p:nvSpPr>
+          <p:cNvPr id="120" name="Shape 120"/>
+          <p:cNvSpPr>
+            <a:spLocks noGrp="1" noRot="1" noChangeAspect="1"/>
+          </p:cNvSpPr>
+          <p:nvPr>
+            <p:ph type="sldImg" idx="2"/>
+          </p:nvPr>
+        </p:nvSpPr>
+        <p:spPr>
+          <a:xfrm>
+            <a:off x="381000" y="685800"/>
+            <a:ext cx="6096000" cy="3429000"/>
+          </a:xfrm>
+          <a:custGeom>
+            <a:avLst/>
+            <a:gdLst/>
+            <a:ahLst/>
+            <a:cxnLst/>
+            <a:rect l="0" t="0" r="0" b="0"/>
+            <a:pathLst>
+              <a:path w="120000" h="120000" extrusionOk="0">
+                <a:moveTo>
+                  <a:pt x="0" y="0"/>
+                </a:moveTo>
+                <a:lnTo>
+                  <a:pt x="120000" y="0"/>
+                </a:lnTo>
+                <a:lnTo>
+                  <a:pt x="120000" y="120000"/>
+                </a:lnTo>
+                <a:lnTo>
+                  <a:pt x="0" y="120000"/>
+                </a:lnTo>
+                <a:close/>
+              </a:path>
+            </a:pathLst>
+          </a:custGeom>
+        </p:spPr>
+      </p:sp>
+      <p:sp>
+        <p:nvSpPr>
+          <p:cNvPr id="121" name="Shape 121"/>
+          <p:cNvSpPr txBox="1">
+            <a:spLocks noGrp="1"/>
+          </p:cNvSpPr>
+          <p:nvPr>
+            <p:ph type="body" idx="1"/>
+          </p:nvPr>
+        </p:nvSpPr>
+        <p:spPr>
+          <a:xfrm>
+            <a:off x="685800" y="4343400"/>
+            <a:ext cx="5486399" cy="4114800"/>
+          </a:xfrm>
+          <a:prstGeom prst="rect">
+            <a:avLst/>
+          </a:prstGeom>
+        </p:spPr>
+        <p:txBody>
+          <a:bodyPr lIns="91425" tIns="91425" rIns="91425" bIns="91425" anchor="t" anchorCtr="0">
+            <a:noAutofit/>
+          </a:bodyPr>
+          <a:lstStyle/>
+          <a:p>
+            <a:pPr fontAlgn="base"/>
+            <a:r>
+              <a:rPr lang="vi-VN" sz="1100" b="1" i="0" kern="1200" smtClean="0">
+                <a:solidFill>
+                  <a:schemeClr val="tx1"/>
+                </a:solidFill>
+                <a:effectLst/>
+                <a:latin typeface="+mn-lt"/>
+                <a:ea typeface="+mn-ea"/>
+                <a:cs typeface="+mn-cs"/>
+              </a:rPr>
+              <a:t>Code first</a:t>
+            </a:r>
+            <a:endParaRPr lang="vi-VN" sz="1100" b="0" i="0" kern="1200" smtClean="0">
+              <a:solidFill>
+                <a:schemeClr val="tx1"/>
+              </a:solidFill>
+              <a:effectLst/>
+              <a:latin typeface="+mn-lt"/>
+              <a:ea typeface="+mn-ea"/>
+              <a:cs typeface="+mn-cs"/>
+            </a:endParaRPr>
+          </a:p>
+          <a:p>
+            <a:pPr fontAlgn="base"/>
+            <a:r>
+              <a:rPr lang="vi-VN" sz="1100" b="0" i="0" kern="1200" smtClean="0">
+                <a:solidFill>
+                  <a:schemeClr val="tx1"/>
+                </a:solidFill>
+                <a:effectLst/>
+                <a:latin typeface="+mn-lt"/>
+                <a:ea typeface="+mn-ea"/>
+                <a:cs typeface="+mn-cs"/>
+              </a:rPr>
+              <a:t>Hay dùng, đặc biệt đối với ai thích viết code và không thích entity framework tự động generate code cho mình vì nó quá phức tạp và khó hiểu.</a:t>
+            </a:r>
+          </a:p>
+          <a:p>
+            <a:pPr fontAlgn="base"/>
+            <a:r>
+              <a:rPr lang="vi-VN" sz="1100" b="0" i="0" kern="1200" smtClean="0">
+                <a:solidFill>
+                  <a:schemeClr val="tx1"/>
+                </a:solidFill>
+                <a:effectLst/>
+                <a:latin typeface="+mn-lt"/>
+                <a:ea typeface="+mn-ea"/>
+                <a:cs typeface="+mn-cs"/>
+              </a:rPr>
+              <a:t>Toàn quyền kiểm soát code vì tự viết tất cả, code tự động được generate thì rất khó chỉnh sửa (khi tự viết được tất cả bạn sẽ rất thích thú như mình vậy, và ăn hành sướng luôn kkkk)</a:t>
+            </a:r>
+          </a:p>
+          <a:p>
+            <a:pPr fontAlgn="base"/>
+            <a:r>
+              <a:rPr lang="vi-VN" sz="1100" b="0" i="0" kern="1200" smtClean="0">
+                <a:solidFill>
+                  <a:schemeClr val="tx1"/>
+                </a:solidFill>
+                <a:effectLst/>
+                <a:latin typeface="+mn-lt"/>
+                <a:ea typeface="+mn-ea"/>
+                <a:cs typeface="+mn-cs"/>
+              </a:rPr>
+              <a:t>Những thay đổi trên code sẽ làm thay đổi database và có thể mất dữ liệu và code quyết định database. Nếu code không cứng sẽ rất nguy hiểm, nên backup databse thường xuyên.</a:t>
+            </a:r>
+          </a:p>
+          <a:p>
+            <a:pPr fontAlgn="base"/>
+            <a:r>
+              <a:rPr lang="vi-VN" sz="1100" b="0" i="0" kern="1200" smtClean="0">
+                <a:solidFill>
+                  <a:schemeClr val="tx1"/>
+                </a:solidFill>
+                <a:effectLst/>
+                <a:latin typeface="+mn-lt"/>
+                <a:ea typeface="+mn-ea"/>
+                <a:cs typeface="+mn-cs"/>
+              </a:rPr>
+              <a:t>Sửa trực tiếp Database trên SQl có thể sẽ bị mất.</a:t>
+            </a:r>
+          </a:p>
+          <a:p>
+            <a:pPr fontAlgn="base"/>
+            <a:r>
+              <a:rPr lang="vi-VN" sz="1100" b="1" i="0" kern="1200" smtClean="0">
+                <a:solidFill>
+                  <a:schemeClr val="tx1"/>
+                </a:solidFill>
+                <a:effectLst/>
+                <a:latin typeface="+mn-lt"/>
+                <a:ea typeface="+mn-ea"/>
+                <a:cs typeface="+mn-cs"/>
+              </a:rPr>
+              <a:t>Database first</a:t>
+            </a:r>
+            <a:endParaRPr lang="vi-VN" sz="1100" b="0" i="0" kern="1200" smtClean="0">
+              <a:solidFill>
+                <a:schemeClr val="tx1"/>
+              </a:solidFill>
+              <a:effectLst/>
+              <a:latin typeface="+mn-lt"/>
+              <a:ea typeface="+mn-ea"/>
+              <a:cs typeface="+mn-cs"/>
+            </a:endParaRPr>
+          </a:p>
+          <a:p>
+            <a:pPr fontAlgn="base"/>
+            <a:r>
+              <a:rPr lang="vi-VN" sz="1100" b="0" i="0" kern="1200" smtClean="0">
+                <a:solidFill>
+                  <a:schemeClr val="tx1"/>
+                </a:solidFill>
+                <a:effectLst/>
+                <a:latin typeface="+mn-lt"/>
+                <a:ea typeface="+mn-ea"/>
+                <a:cs typeface="+mn-cs"/>
+              </a:rPr>
+              <a:t>Hay dùng, nếu đã có sẵn database hoàn chỉnh</a:t>
+            </a:r>
+          </a:p>
+          <a:p>
+            <a:pPr fontAlgn="base"/>
+            <a:r>
+              <a:rPr lang="vi-VN" sz="1100" b="0" i="0" kern="1200" smtClean="0">
+                <a:solidFill>
+                  <a:schemeClr val="tx1"/>
+                </a:solidFill>
+                <a:effectLst/>
+                <a:latin typeface="+mn-lt"/>
+                <a:ea typeface="+mn-ea"/>
+                <a:cs typeface="+mn-cs"/>
+              </a:rPr>
+              <a:t>Entity Framework tạo class từ database</a:t>
+            </a:r>
+          </a:p>
+          <a:p>
+            <a:pPr fontAlgn="base"/>
+            <a:r>
+              <a:rPr lang="vi-VN" sz="1100" b="0" i="0" kern="1200" smtClean="0">
+                <a:solidFill>
+                  <a:schemeClr val="tx1"/>
+                </a:solidFill>
+                <a:effectLst/>
+                <a:latin typeface="+mn-lt"/>
+                <a:ea typeface="+mn-ea"/>
+                <a:cs typeface="+mn-cs"/>
+              </a:rPr>
+              <a:t>Khó chỉnh sửa code, nếu bạn muốn thêm tính năng thì không được sửa trực tiếp từ file emdx mà phải dùng partial class, tức là viết thêm class chứ không được sửa class được tạo sẵn.</a:t>
+            </a:r>
+          </a:p>
+          <a:p>
+            <a:pPr fontAlgn="base"/>
+            <a:r>
+              <a:rPr lang="vi-VN" sz="1100" b="0" i="0" kern="1200" smtClean="0">
+                <a:solidFill>
+                  <a:schemeClr val="tx1"/>
+                </a:solidFill>
+                <a:effectLst/>
+                <a:latin typeface="+mn-lt"/>
+                <a:ea typeface="+mn-ea"/>
+                <a:cs typeface="+mn-cs"/>
+              </a:rPr>
+              <a:t>Có thể sửa Database trực tiếp trên SQL vì database quyết định model. bạn có thể update model từ Database.</a:t>
+            </a:r>
+          </a:p>
+          <a:p>
+            <a:pPr fontAlgn="base"/>
+            <a:r>
+              <a:rPr lang="vi-VN" sz="1100" b="1" i="0" kern="1200" smtClean="0">
+                <a:solidFill>
+                  <a:schemeClr val="tx1"/>
+                </a:solidFill>
+                <a:effectLst/>
+                <a:latin typeface="+mn-lt"/>
+                <a:ea typeface="+mn-ea"/>
+                <a:cs typeface="+mn-cs"/>
+              </a:rPr>
+              <a:t>Model first</a:t>
+            </a:r>
+            <a:endParaRPr lang="vi-VN" sz="1100" b="0" i="0" kern="1200" smtClean="0">
+              <a:solidFill>
+                <a:schemeClr val="tx1"/>
+              </a:solidFill>
+              <a:effectLst/>
+              <a:latin typeface="+mn-lt"/>
+              <a:ea typeface="+mn-ea"/>
+              <a:cs typeface="+mn-cs"/>
+            </a:endParaRPr>
+          </a:p>
+          <a:p>
+            <a:pPr fontAlgn="base"/>
+            <a:r>
+              <a:rPr lang="vi-VN" sz="1100" b="0" i="0" kern="1200" smtClean="0">
+                <a:solidFill>
+                  <a:schemeClr val="tx1"/>
+                </a:solidFill>
+                <a:effectLst/>
+                <a:latin typeface="+mn-lt"/>
+                <a:ea typeface="+mn-ea"/>
+                <a:cs typeface="+mn-cs"/>
+              </a:rPr>
+              <a:t>Ít dùng, dùng với những người không thích viết code nhiều.</a:t>
+            </a:r>
+          </a:p>
+          <a:p>
+            <a:pPr fontAlgn="base"/>
+            <a:r>
+              <a:rPr lang="vi-VN" sz="1100" b="1" i="0" kern="1200" smtClean="0">
+                <a:solidFill>
+                  <a:schemeClr val="tx1"/>
+                </a:solidFill>
+                <a:effectLst/>
+                <a:latin typeface="+mn-lt"/>
+                <a:ea typeface="+mn-ea"/>
+                <a:cs typeface="+mn-cs"/>
+              </a:rPr>
+              <a:t>Ý kiến cá nhân</a:t>
+            </a:r>
+          </a:p>
+          <a:p>
+            <a:pPr fontAlgn="base"/>
+            <a:r>
+              <a:rPr lang="vi-VN" sz="1100" b="0" i="0" kern="1200" smtClean="0">
+                <a:solidFill>
+                  <a:schemeClr val="tx1"/>
+                </a:solidFill>
+                <a:effectLst/>
+                <a:latin typeface="+mn-lt"/>
+                <a:ea typeface="+mn-ea"/>
+                <a:cs typeface="+mn-cs"/>
+              </a:rPr>
+              <a:t>– Code First, mình hay xài nhưng với những app nhỏ, ít table.</a:t>
+            </a:r>
+          </a:p>
+          <a:p>
+            <a:pPr fontAlgn="base"/>
+            <a:r>
+              <a:rPr lang="vi-VN" sz="1100" b="0" i="0" kern="1200" smtClean="0">
+                <a:solidFill>
+                  <a:schemeClr val="tx1"/>
+                </a:solidFill>
+                <a:effectLst/>
+                <a:latin typeface="+mn-lt"/>
+                <a:ea typeface="+mn-ea"/>
+                <a:cs typeface="+mn-cs"/>
+              </a:rPr>
+              <a:t>– Database First là lựa chọn ưu tiên từ trước tới giờ. Vẫn giữ cách truyền thống là tốt nhất: thiết kế database</a:t>
+            </a:r>
+          </a:p>
+          <a:p>
+            <a:pPr fontAlgn="base"/>
+            <a:r>
+              <a:rPr lang="vi-VN" sz="1100" b="0" i="0" kern="1200" smtClean="0">
+                <a:solidFill>
+                  <a:schemeClr val="tx1"/>
+                </a:solidFill>
+                <a:effectLst/>
+                <a:latin typeface="+mn-lt"/>
+                <a:ea typeface="+mn-ea"/>
+                <a:cs typeface="+mn-cs"/>
+              </a:rPr>
+              <a:t>– Model First hay Database First không khác nhau mấy.</a:t>
+            </a:r>
+          </a:p>
+          <a:p>
+            <a:pPr fontAlgn="base"/>
+            <a:r>
+              <a:rPr lang="vi-VN" sz="1100" b="0" i="0" kern="1200" smtClean="0">
+                <a:solidFill>
+                  <a:schemeClr val="tx1"/>
+                </a:solidFill>
+                <a:effectLst/>
+                <a:latin typeface="+mn-lt"/>
+                <a:ea typeface="+mn-ea"/>
+                <a:cs typeface="+mn-cs"/>
+              </a:rPr>
+              <a:t>– Model First nghe nói hay xảy ra lỗi và mình chưa xài bao giờ.</a:t>
+            </a:r>
+          </a:p>
+        </p:txBody>
+      </p:sp>
+    </p:spTree>
+    <p:extLst>
+      <p:ext uri="{BB962C8B-B14F-4D97-AF65-F5344CB8AC3E}">
+        <p14:creationId xmlns:p14="http://schemas.microsoft.com/office/powerpoint/2010/main" val="2147363384"/>
+      </p:ext>
+    </p:extLst>
+  </p:cSld>
+  <p:clrMapOvr>
+    <a:masterClrMapping/>
+  </p:clrMapOvr>
+</p:notes>
+</file>
+
+<file path=ppt/notesSlides/notesSlide15.xml><?xml version="1.0" encoding="utf-8"?>
 <p:notes xmlns:a="http://schemas.openxmlformats.org/drawingml/2006/main" xmlns:r="http://schemas.openxmlformats.org/officeDocument/2006/relationships" xmlns:p="http://schemas.openxmlformats.org/presentationml/2006/main" showMasterSp="0" showMasterPhAnim="0">
   <p:cSld>
     <p:spTree>
@@ -1413,6 +2003,56 @@
                 <a:ea typeface="+mn-ea"/>
                 <a:cs typeface="+mn-cs"/>
               </a:rPr>
+              <a:t>Entity Framework là một bộ ánh xạ đối tượng – quan hệ cho phép người lập trình .NET làm việc với dữ liệu quan hệ qua các đối tượng (object) nó giúp lập trình viên không cần viết mã cho hầu hết những gì liên quan đến truy cập dữ liệu.</a:t>
+            </a:r>
+          </a:p>
+          <a:p>
+            <a:endParaRPr lang="vi-VN" sz="1100" b="0" i="0" kern="1200" smtClean="0">
+              <a:solidFill>
+                <a:schemeClr val="tx1"/>
+              </a:solidFill>
+              <a:effectLst/>
+              <a:latin typeface="+mn-lt"/>
+              <a:ea typeface="+mn-ea"/>
+              <a:cs typeface="+mn-cs"/>
+            </a:endParaRPr>
+          </a:p>
+          <a:p>
+            <a:pPr fontAlgn="base"/>
+            <a:r>
+              <a:rPr lang="vi-VN" sz="1100" b="0" i="0" kern="1200" smtClean="0">
+                <a:solidFill>
+                  <a:schemeClr val="tx1"/>
+                </a:solidFill>
+                <a:effectLst/>
+                <a:latin typeface="+mn-lt"/>
+                <a:ea typeface="+mn-ea"/>
+                <a:cs typeface="+mn-cs"/>
+              </a:rPr>
+              <a:t>Nói</a:t>
+            </a:r>
+            <a:r>
+              <a:rPr lang="vi-VN" sz="1100" b="0" i="0" kern="1200" baseline="0" smtClean="0">
+                <a:solidFill>
+                  <a:schemeClr val="tx1"/>
+                </a:solidFill>
+                <a:effectLst/>
+                <a:latin typeface="+mn-lt"/>
+                <a:ea typeface="+mn-ea"/>
+                <a:cs typeface="+mn-cs"/>
+              </a:rPr>
+              <a:t> dễ hiểu thì </a:t>
+            </a:r>
+            <a:r>
+              <a:rPr lang="vi-VN" sz="1100" b="0" i="0" kern="1200" smtClean="0">
+                <a:solidFill>
+                  <a:schemeClr val="tx1"/>
+                </a:solidFill>
+                <a:effectLst/>
+                <a:latin typeface="+mn-lt"/>
+                <a:ea typeface="+mn-ea"/>
+                <a:cs typeface="+mn-cs"/>
+              </a:rPr>
               <a:t>O/RM là cộng cụ để generate class từ database.</a:t>
             </a:r>
           </a:p>
@@ -1489,7 +2129,7 @@
                 <a:ea typeface="+mn-ea"/>
                 <a:cs typeface="+mn-cs"/>
               </a:rPr>
-              <a:t>O/RM giúp tách riêng database và  domain class để dễ phát triển và maintain.</a:t>
+              <a:t>O/RM giúp tách riêng database và domain class để dễ phát triển và maintain.</a:t>
             </a:r>
             <a:r>
               <a:rPr lang="vi-VN" sz="1100" b="0" i="0" u="none" strike="noStrike" kern="1200" smtClean="0">
@@ -1620,6 +2260,14 @@
               </a:spcBef>
               <a:buNone/>
             </a:pPr>
+            <a:r>
+              <a:rPr lang="en-US" smtClean="0"/>
+              <a:t>Ví</a:t>
+            </a:r>
+            <a:r>
+              <a:rPr lang="en-US" baseline="0" smtClean="0"/>
+              <a:t> dụ như đoạn code demo sau (next slide)</a:t>
+            </a:r>
             <a:endParaRPr/>
           </a:p>
         </p:txBody>
@@ -3114,7 +3762,7 @@
     <p:sldLayoutId id="2147483648" r:id="rId1"/>
     <p:sldLayoutId id="2147483653" r:id="rId2"/>
   </p:sldLayoutIdLst>
-  <p:hf sldNum="0" hdr="0" ftr="0"/>
+  <p:hf hdr="0" dt="0"/>
   <p:txStyles>
     <p:titleStyle>
       <a:defPPr marR="0" lvl="0" algn="l" rtl="0">
@@ -3596,7 +4244,7 @@
         <p:spPr>
           <a:xfrm>
             <a:off x="483294" y="1580848"/>
-            <a:ext cx="4611219" cy="1839185"/>
+            <a:ext cx="4311343" cy="1839185"/>
           </a:xfrm>
           <a:prstGeom prst="rect">
             <a:avLst/>
@@ -3616,7 +4264,7 @@
             </a:pPr>
             <a:r>
               <a:rPr lang="en" sz="5600" smtClean="0"/>
-              <a:t>Entity </a:t>
+              <a:t>Entity</a:t>
             </a:r>
             <a:br>
               <a:rPr lang="en" sz="5600" smtClean="0"/>
@@ -3641,8 +4289,8 @@
         </p:nvSpPr>
         <p:spPr>
           <a:xfrm>
-            <a:off x="5692657" y="3228886"/>
-            <a:ext cx="3100706" cy="1231106"/>
+            <a:off x="5414363" y="2990345"/>
+            <a:ext cx="3268463" cy="1610697"/>
           </a:xfrm>
           <a:prstGeom prst="rect">
             <a:avLst/>
@@ -3670,16 +4318,17 @@
                     </a:srgbClr>
                   </a:outerShdw>
                 </a:effectLst>
-                <a:latin typeface="Montserrat"/>
+                <a:latin typeface="Segoe UI" panose="020B0502040204020203" pitchFamily="34" charset="0"/>
                 <a:cs typeface="Segoe UI" panose="020B0502040204020203" pitchFamily="34" charset="0"/>
               </a:rPr>
               <a:t>Nhóm thực hiện:</a:t>
             </a:r>
           </a:p>
           <a:p>
-            <a:pPr marL="285750" indent="-285750">
-              <a:buFontTx/>
-              <a:buChar char="-"/>
+            <a:pPr>
+              <a:spcBef>
+                <a:spcPts val="500"/>
+              </a:spcBef>
             </a:pPr>
             <a:r>
               <a:rPr lang="en-US" smtClean="0">
@@ -3696,19 +4345,13 @@
                     </a:srgbClr>
                   </a:outerShdw>
                 </a:effectLst>
-                <a:latin typeface="Montserrat"/>
+                <a:latin typeface="Segoe UI" panose="020B0502040204020203" pitchFamily="34" charset="0"/>
                 <a:cs typeface="Segoe UI" panose="020B0502040204020203" pitchFamily="34" charset="0"/>
               </a:rPr>
-              <a:t>Nguyễn Văn Quang – 13520675</a:t>
-            </a:r>
-          </a:p>
-          <a:p>
-            <a:pPr marL="285750" indent="-285750">
-              <a:buFontTx/>
-              <a:buChar char="-"/>
-            </a:pPr>
-            <a:r>
-              <a:rPr lang="en-US" smtClean="0">
+              <a:t>   </a:t>
+            </a:r>
+            <a:r>
+              <a:rPr lang="en-US" sz="1600" smtClean="0">
                 <a:solidFill>
                   <a:schemeClr val="accent2">
                     <a:lumMod val="20000"/>
@@ -3722,19 +4365,20 @@
                     </a:srgbClr>
                   </a:outerShdw>
                 </a:effectLst>
-                <a:latin typeface="Montserrat"/>
+                <a:latin typeface="Segoe UI" panose="020B0502040204020203" pitchFamily="34" charset="0"/>
                 <a:cs typeface="Segoe UI" panose="020B0502040204020203" pitchFamily="34" charset="0"/>
               </a:rPr>
-              <a:t>Bùi Đình Lộc Thọ     – 13520844</a:t>
-            </a:r>
-          </a:p>
-          <a:p>
-            <a:pPr marL="285750" indent="-285750">
-              <a:buFontTx/>
-              <a:buChar char="-"/>
+              <a:t>13520675 - Nguyễn Văn Quang</a:t>
+            </a:r>
+          </a:p>
+          <a:p>
+            <a:pPr>
+              <a:spcBef>
+                <a:spcPts val="500"/>
+              </a:spcBef>
             </a:pPr>
             <a:r>
-              <a:rPr lang="en-US" smtClean="0">
+              <a:rPr lang="en-US" sz="1600" smtClean="0">
                 <a:solidFill>
                   <a:schemeClr val="accent2">
                     <a:lumMod val="20000"/>
@@ -3748,19 +4392,20 @@
                     </a:srgbClr>
                   </a:outerShdw>
                 </a:effectLst>
-                <a:latin typeface="Montserrat"/>
+                <a:latin typeface="Segoe UI" panose="020B0502040204020203" pitchFamily="34" charset="0"/>
                 <a:cs typeface="Segoe UI" panose="020B0502040204020203" pitchFamily="34" charset="0"/>
               </a:rPr>
-              <a:t>Nguyễn Thanh Hải   – 13520231</a:t>
-            </a:r>
-          </a:p>
-          <a:p>
-            <a:pPr marL="285750" indent="-285750">
-              <a:buFontTx/>
-              <a:buChar char="-"/>
+              <a:t>   13520844 - Bùi Đình Lộc Thọ</a:t>
+            </a:r>
+          </a:p>
+          <a:p>
+            <a:pPr>
+              <a:spcBef>
+                <a:spcPts val="500"/>
+              </a:spcBef>
             </a:pPr>
             <a:r>
-              <a:rPr lang="en-US" smtClean="0">
+              <a:rPr lang="en-US" sz="1600" smtClean="0">
                 <a:solidFill>
                   <a:schemeClr val="accent2">
                     <a:lumMod val="20000"/>
@@ -3774,12 +4419,39 @@
                     </a:srgbClr>
                   </a:outerShdw>
                 </a:effectLst>
-                <a:latin typeface="Montserrat"/>
+                <a:latin typeface="Segoe UI" panose="020B0502040204020203" pitchFamily="34" charset="0"/>
                 <a:cs typeface="Segoe UI" panose="020B0502040204020203" pitchFamily="34" charset="0"/>
               </a:rPr>
-              <a:t>Đoàn Duy Phương   – 13520657</a:t>
-            </a:r>
-            <a:endParaRPr lang="vi-VN">
+              <a:t>   13520231 - Nguyễn Thanh Hải</a:t>
+            </a:r>
+          </a:p>
+          <a:p>
+            <a:pPr>
+              <a:spcBef>
+                <a:spcPts val="500"/>
+              </a:spcBef>
+            </a:pPr>
+            <a:r>
+              <a:rPr lang="en-US" sz="1600" smtClean="0">
+                <a:solidFill>
+                  <a:schemeClr val="accent2">
+                    <a:lumMod val="20000"/>
+                    <a:lumOff val="80000"/>
+                  </a:schemeClr>
+                </a:solidFill>
+                <a:effectLst>
+                  <a:outerShdw blurRad="38100" dist="38100" dir="2700000" algn="tl">
+                    <a:srgbClr val="000000">
+                      <a:alpha val="43137"/>
+                    </a:srgbClr>
+                  </a:outerShdw>
+                </a:effectLst>
+                <a:latin typeface="Segoe UI" panose="020B0502040204020203" pitchFamily="34" charset="0"/>
+                <a:cs typeface="Segoe UI" panose="020B0502040204020203" pitchFamily="34" charset="0"/>
+              </a:rPr>
+              <a:t>   13520657 - Đoàn Duy Phương</a:t>
+            </a:r>
+            <a:endParaRPr lang="vi-VN" sz="1600">
               <a:solidFill>
                 <a:schemeClr val="accent2">
                   <a:lumMod val="20000"/>
@@ -3793,7 +4465,7 @@
                   </a:srgbClr>
                 </a:outerShdw>
               </a:effectLst>
-              <a:latin typeface="Montserrat"/>
+              <a:latin typeface="Segoe UI" panose="020B0502040204020203" pitchFamily="34" charset="0"/>
               <a:cs typeface="Segoe UI" panose="020B0502040204020203" pitchFamily="34" charset="0"/>
             </a:endParaRPr>
           </a:p>
@@ -3822,7 +4494,7 @@
         </p:blipFill>
         <p:spPr bwMode="auto">
           <a:xfrm>
-            <a:off x="5692657" y="702981"/>
+            <a:off x="5414364" y="520100"/>
             <a:ext cx="3100707" cy="1688164"/>
           </a:xfrm>
           <a:prstGeom prst="rect">
@@ -3848,8 +4520,8 @@
         </p:nvSpPr>
         <p:spPr>
           <a:xfrm>
-            <a:off x="5692657" y="2582942"/>
-            <a:ext cx="3100706" cy="584775"/>
+            <a:off x="5414364" y="2304645"/>
+            <a:ext cx="3100706" cy="679673"/>
           </a:xfrm>
           <a:prstGeom prst="rect">
             <a:avLst/>
@@ -3877,19 +4549,89 @@
                     </a:srgbClr>
                   </a:outerShdw>
                 </a:effectLst>
-                <a:latin typeface="Montserrat"/>
+                <a:latin typeface="Segoe UI" panose="020B0502040204020203" pitchFamily="34" charset="0"/>
                 <a:cs typeface="Segoe UI" panose="020B0502040204020203" pitchFamily="34" charset="0"/>
               </a:rPr>
               <a:t>GVHD:</a:t>
             </a:r>
           </a:p>
           <a:p>
-            <a:r>
-              <a:rPr lang="en-US" smtClean="0">
+            <a:pPr>
+              <a:spcBef>
+                <a:spcPts val="500"/>
+              </a:spcBef>
+            </a:pPr>
+            <a:r>
+              <a:rPr lang="en-US" sz="1600">
                 <a:solidFill>
                   <a:schemeClr val="accent2">
                     <a:lumMod val="20000"/>
                     <a:lumOff val="80000"/>
+                  </a:schemeClr>
+                </a:solidFill>
+                <a:effectLst>
+                  <a:outerShdw blurRad="38100" dist="38100" dir="2700000" algn="tl">
+                    <a:srgbClr val="000000">
+                      <a:alpha val="43137"/>
+                    </a:srgbClr>
+                  </a:outerShdw>
+                </a:effectLst>
+                <a:latin typeface="Segoe UI" panose="020B0502040204020203" pitchFamily="34" charset="0"/>
+                <a:cs typeface="Segoe UI" panose="020B0502040204020203" pitchFamily="34" charset="0"/>
+              </a:rPr>
+              <a:t> </a:t>
+            </a:r>
+            <a:r>
+              <a:rPr lang="en-US" sz="1600" smtClean="0">
+                <a:solidFill>
+                  <a:schemeClr val="accent2">
+                    <a:lumMod val="20000"/>
+                    <a:lumOff val="80000"/>
+                  </a:schemeClr>
+                </a:solidFill>
+                <a:effectLst>
+                  <a:outerShdw blurRad="38100" dist="38100" dir="2700000" algn="tl">
+                    <a:srgbClr val="000000">
+                      <a:alpha val="43137"/>
+                    </a:srgbClr>
+                  </a:outerShdw>
+                </a:effectLst>
+                <a:latin typeface="Segoe UI" panose="020B0502040204020203" pitchFamily="34" charset="0"/>
+                <a:cs typeface="Segoe UI" panose="020B0502040204020203" pitchFamily="34" charset="0"/>
+              </a:rPr>
+              <a:t>  Th.S Phạm Thi Vương</a:t>
+            </a:r>
+          </a:p>
+        </p:txBody>
+      </p:sp>
+      <p:sp>
+        <p:nvSpPr>
+          <p:cNvPr id="3" name="TextBox 2"/>
+          <p:cNvSpPr txBox="1"/>
+          <p:nvPr/>
+        </p:nvSpPr>
+        <p:spPr>
+          <a:xfrm flipH="1">
+            <a:off x="289936" y="4173502"/>
+            <a:ext cx="4804577" cy="461665"/>
+          </a:xfrm>
+          <a:prstGeom prst="rect">
+            <a:avLst/>
+          </a:prstGeom>
+          <a:noFill/>
+        </p:spPr>
+        <p:txBody>
+          <a:bodyPr wrap="square" rtlCol="0">
+            <a:spAutoFit/>
+          </a:bodyPr>
+          <a:lstStyle/>
+          <a:p>
+            <a:r>
+              <a:rPr lang="en-US" sz="2300" smtClean="0">
+                <a:solidFill>
+                  <a:schemeClr val="tx1">
+                    <a:lumMod val="65000"/>
+                    <a:lumOff val="35000"/>
                   </a:schemeClr>
                 </a:solidFill>
                 <a:effectLst>
@@ -3900,10 +4642,25 @@
                   </a:outerShdw>
                 </a:effectLst>
                 <a:latin typeface="Montserrat"/>
-                <a:cs typeface="Segoe UI" panose="020B0502040204020203" pitchFamily="34" charset="0"/>
-              </a:rPr>
-              <a:t>     Th.S Phạm Thi Vương</a:t>
-            </a:r>
+              </a:rPr>
+              <a:t>CÔNG NGHỆ .NET - SE310.H21</a:t>
+            </a:r>
+            <a:endParaRPr lang="vi-VN" sz="2300">
+              <a:solidFill>
+                <a:schemeClr val="tx1">
+                  <a:lumMod val="65000"/>
+                  <a:lumOff val="35000"/>
+                </a:schemeClr>
+              </a:solidFill>
+              <a:effectLst>
+                <a:outerShdw blurRad="38100" dist="38100" dir="2700000" algn="tl">
+                  <a:srgbClr val="000000">
+                    <a:alpha val="43137"/>
+                  </a:srgbClr>
+                </a:outerShdw>
+              </a:effectLst>
+              <a:latin typeface="Montserrat"/>
+            </a:endParaRPr>
           </a:p>
         </p:txBody>
       </p:sp>
@@ -3993,11 +4750,7 @@
             </a:r>
             <a:r>
               <a:rPr lang="vi-VN"/>
-              <a:t>class trước, sau đó generate </a:t>
-            </a:r>
-            <a:r>
-              <a:rPr lang="vi-VN"/>
-              <a:t>database </a:t>
+              <a:t>class trước, sau đó generate database </a:t>
             </a:r>
             <a:endParaRPr lang="vi-VN" smtClean="0"/>
           </a:p>
@@ -4154,8 +4907,66 @@
             </a:pPr>
             <a:r>
               <a:rPr lang="vi-VN" smtClean="0"/>
-              <a:t>Cài đặt Entity Framework</a:t>
-            </a:r>
+              <a:t>Cài đặt Entity </a:t>
+            </a:r>
+            <a:r>
+              <a:rPr lang="vi-VN"/>
+              <a:t>Framework</a:t>
+            </a:r>
+          </a:p>
+          <a:p>
+            <a:pPr marL="342900" indent="-342900">
+              <a:spcBef>
+                <a:spcPts val="1500"/>
+              </a:spcBef>
+            </a:pPr>
+            <a:r>
+              <a:rPr lang="vi-VN"/>
+              <a:t>Sử dụng </a:t>
+            </a:r>
+            <a:r>
+              <a:rPr lang="vi-VN"/>
+              <a:t>DBContext</a:t>
+            </a:r>
+          </a:p>
+          <a:p>
+            <a:pPr marL="342900" indent="-342900">
+              <a:spcBef>
+                <a:spcPts val="1500"/>
+              </a:spcBef>
+            </a:pPr>
+            <a:r>
+              <a:rPr lang="vi-VN"/>
+              <a:t>Demo sử dụng Code First</a:t>
+            </a:r>
+            <a:endParaRPr lang="vi-VN"/>
+          </a:p>
+          <a:p>
+            <a:pPr marL="342900" indent="-342900">
+              <a:spcBef>
+                <a:spcPts val="1500"/>
+              </a:spcBef>
+            </a:pPr>
+            <a:r>
+              <a:rPr lang="vi-VN"/>
+              <a:t>Demo sử dụng Databases First</a:t>
+            </a:r>
+          </a:p>
+          <a:p>
+            <a:pPr marL="342900" indent="-342900">
+              <a:spcBef>
+                <a:spcPts val="1500"/>
+              </a:spcBef>
+            </a:pPr>
+            <a:r>
+              <a:rPr lang="vi-VN"/>
+              <a:t>Demo sử dụng Models </a:t>
+            </a:r>
+            <a:r>
+              <a:rPr lang="vi-VN" smtClean="0"/>
+              <a:t>First</a:t>
+            </a:r>
+            <a:endParaRPr lang="vi-VN" smtClean="0"/>
           </a:p>
           <a:p>
             <a:pPr marL="342900" indent="-342900">
@@ -4167,79 +4978,6 @@
               <a:rPr lang="vi-VN" smtClean="0"/>
               <a:t>Tạo Entity Data Model (EDM)</a:t>
             </a:r>
-          </a:p>
-          <a:p>
-            <a:pPr marL="342900" indent="-342900">
-              <a:spcBef>
-                <a:spcPts val="1500"/>
-              </a:spcBef>
-            </a:pPr>
-            <a:r>
-              <a:rPr lang="vi-VN"/>
-              <a:t>Sử </a:t>
-            </a:r>
-            <a:r>
-              <a:rPr lang="vi-VN"/>
-              <a:t>dụng </a:t>
-            </a:r>
-            <a:r>
-              <a:rPr lang="vi-VN" smtClean="0"/>
-              <a:t>DBContext</a:t>
-            </a:r>
-          </a:p>
-          <a:p>
-            <a:pPr marL="342900" indent="-342900">
-              <a:spcBef>
-                <a:spcPts val="1500"/>
-              </a:spcBef>
-            </a:pPr>
-            <a:r>
-              <a:rPr lang="vi-VN" smtClean="0"/>
-              <a:t>Demo sử dụng Databases First</a:t>
-            </a:r>
-          </a:p>
-          <a:p>
-            <a:pPr marL="342900" indent="-342900">
-              <a:spcBef>
-                <a:spcPts val="1500"/>
-              </a:spcBef>
-            </a:pPr>
-            <a:r>
-              <a:rPr lang="vi-VN"/>
-              <a:t>Demo sử </a:t>
-            </a:r>
-            <a:r>
-              <a:rPr lang="vi-VN"/>
-              <a:t>dụng </a:t>
-            </a:r>
-            <a:r>
-              <a:rPr lang="vi-VN" smtClean="0"/>
-              <a:t>Models First</a:t>
-            </a:r>
-          </a:p>
-          <a:p>
-            <a:pPr marL="342900" indent="-342900">
-              <a:spcBef>
-                <a:spcPts val="1500"/>
-              </a:spcBef>
-            </a:pPr>
-            <a:r>
-              <a:rPr lang="vi-VN"/>
-              <a:t>Demo sử </a:t>
-            </a:r>
-            <a:r>
-              <a:rPr lang="vi-VN"/>
-              <a:t>dụng </a:t>
-            </a:r>
-            <a:r>
-              <a:rPr lang="vi-VN" smtClean="0"/>
-              <a:t>Code </a:t>
-            </a:r>
-            <a:r>
-              <a:rPr lang="vi-VN"/>
-              <a:t>First</a:t>
-            </a:r>
-            <a:endParaRPr lang="vi-VN" smtClean="0"/>
           </a:p>
         </p:txBody>
       </p:sp>
@@ -4252,6 +4990,171 @@
 </file>
 
 <file path=ppt/slides/slide12.xml><?xml version="1.0" encoding="utf-8"?>
+<p:sld xmlns:a="http://schemas.openxmlformats.org/drawingml/2006/main" xmlns:r="http://schemas.openxmlformats.org/officeDocument/2006/relationships" xmlns:p="http://schemas.openxmlformats.org/presentationml/2006/main">
+  <p:cSld>
+    <p:bg>
+      <p:bgPr>
+        <a:solidFill>
+          <a:srgbClr val="9C27B0"/>
+        </a:solidFill>
+        <a:effectLst/>
+      </p:bgPr>
+    </p:bg>
+    <p:spTree>
+      <p:nvGrpSpPr>
+        <p:cNvPr id="1" name="Shape 145"/>
+        <p:cNvGrpSpPr/>
+        <p:nvPr/>
+      </p:nvGrpSpPr>
+      <p:grpSpPr>
+        <a:xfrm>
+          <a:off x="0" y="0"/>
+          <a:ext cx="0" cy="0"/>
+          <a:chOff x="0" y="0"/>
+          <a:chExt cx="0" cy="0"/>
+        </a:xfrm>
+      </p:grpSpPr>
+      <p:sp>
+        <p:nvSpPr>
+          <p:cNvPr id="6" name="Title 5"/>
+          <p:cNvSpPr>
+            <a:spLocks noGrp="1"/>
+          </p:cNvSpPr>
+          <p:nvPr>
+            <p:ph type="title"/>
+          </p:nvPr>
+        </p:nvSpPr>
+        <p:spPr/>
+        <p:txBody>
+          <a:bodyPr/>
+          <a:lstStyle/>
+          <a:p>
+            <a:r>
+              <a:rPr lang="en-US" smtClean="0">
+                <a:solidFill>
+                  <a:srgbClr val="7030A0"/>
+                </a:solidFill>
+                <a:effectLst>
+                  <a:outerShdw blurRad="38100" dist="38100" dir="2700000" algn="tl">
+                    <a:srgbClr val="000000">
+                      <a:alpha val="43137"/>
+                    </a:srgbClr>
+                  </a:outerShdw>
+                </a:effectLst>
+              </a:rPr>
+              <a:t>Cài đặt Entity Framework</a:t>
+            </a:r>
+            <a:endParaRPr lang="vi-VN"/>
+          </a:p>
+        </p:txBody>
+      </p:sp>
+      <p:sp>
+        <p:nvSpPr>
+          <p:cNvPr id="7" name="Text Placeholder 6"/>
+          <p:cNvSpPr>
+            <a:spLocks noGrp="1"/>
+          </p:cNvSpPr>
+          <p:nvPr>
+            <p:ph type="body" idx="1"/>
+          </p:nvPr>
+        </p:nvSpPr>
+        <p:spPr/>
+        <p:txBody>
+          <a:bodyPr/>
+          <a:lstStyle/>
+          <a:p>
+            <a:pPr marL="342900" indent="-342900">
+              <a:spcBef>
+                <a:spcPts val="1500"/>
+              </a:spcBef>
+            </a:pPr>
+            <a:r>
+              <a:rPr lang="vi-VN" smtClean="0"/>
+              <a:t>Cách 1: TOOLS </a:t>
+            </a:r>
+            <a:r>
+              <a:rPr lang="vi-VN"/>
+              <a:t>-&gt; Nuget Package Manager -&gt; </a:t>
+            </a:r>
+            <a:r>
+              <a:rPr lang="vi-VN" smtClean="0"/>
+              <a:t>    Package </a:t>
+            </a:r>
+            <a:r>
+              <a:rPr lang="vi-VN"/>
+              <a:t>Manager Console </a:t>
+            </a:r>
+            <a:endParaRPr lang="vi-VN" smtClean="0"/>
+          </a:p>
+          <a:p>
+            <a:pPr algn="ctr">
+              <a:spcBef>
+                <a:spcPts val="1500"/>
+              </a:spcBef>
+              <a:buNone/>
+            </a:pPr>
+            <a:r>
+              <a:rPr lang="vi-VN" smtClean="0"/>
+              <a:t>“</a:t>
+            </a:r>
+            <a:r>
+              <a:rPr lang="vi-VN"/>
+              <a:t>Install-Package EntityFramework</a:t>
+            </a:r>
+            <a:r>
+              <a:rPr lang="vi-VN" smtClean="0"/>
+              <a:t>”</a:t>
+            </a:r>
+          </a:p>
+          <a:p>
+            <a:pPr marL="342900" indent="-342900">
+              <a:spcBef>
+                <a:spcPts val="1500"/>
+              </a:spcBef>
+            </a:pPr>
+            <a:r>
+              <a:rPr lang="vi-VN" smtClean="0"/>
+              <a:t>Cách 2: References -&gt; Manage NuGet Packages...</a:t>
+            </a:r>
+          </a:p>
+          <a:p>
+            <a:pPr algn="ctr">
+              <a:spcBef>
+                <a:spcPts val="1500"/>
+              </a:spcBef>
+              <a:buNone/>
+            </a:pPr>
+            <a:r>
+              <a:rPr lang="vi-VN" smtClean="0"/>
+              <a:t>Chọn EntityFramework -&gt; Install</a:t>
+            </a:r>
+            <a:endParaRPr lang="vi-VN"/>
+          </a:p>
+          <a:p>
+            <a:pPr>
+              <a:spcBef>
+                <a:spcPts val="1500"/>
+              </a:spcBef>
+              <a:buNone/>
+            </a:pPr>
+            <a:endParaRPr lang="vi-VN" smtClean="0"/>
+          </a:p>
+        </p:txBody>
+      </p:sp>
+    </p:spTree>
+    <p:extLst>
+      <p:ext uri="{BB962C8B-B14F-4D97-AF65-F5344CB8AC3E}">
+        <p14:creationId xmlns:p14="http://schemas.microsoft.com/office/powerpoint/2010/main" val="1831170823"/>
+      </p:ext>
+    </p:extLst>
+  </p:cSld>
+  <p:clrMapOvr>
+    <a:masterClrMapping/>
+  </p:clrMapOvr>
+</p:sld>
+</file>
+
+<file path=ppt/slides/slide13.xml><?xml version="1.0" encoding="utf-8"?>
 <p:sld xmlns:a="http://schemas.openxmlformats.org/drawingml/2006/main" xmlns:r="http://schemas.openxmlformats.org/officeDocument/2006/relationships" xmlns:p="http://schemas.openxmlformats.org/presentationml/2006/main">
   <p:cSld>
     <p:bg>
@@ -5188,7 +6091,86 @@
 </p:sld>
 </file>
 
-<file path=ppt/slides/slide13.xml><?xml version="1.0" encoding="utf-8"?>
+<file path=ppt/slides/slide14.xml><?xml version="1.0" encoding="utf-8"?>
+<p:sld xmlns:a="http://schemas.openxmlformats.org/drawingml/2006/main" xmlns:r="http://schemas.openxmlformats.org/officeDocument/2006/relationships" xmlns:p="http://schemas.openxmlformats.org/presentationml/2006/main">
+  <p:cSld>
+    <p:bg>
+      <p:bgPr>
+        <a:solidFill>
+          <a:schemeClr val="bg2"/>
+        </a:solidFill>
+        <a:effectLst/>
+      </p:bgPr>
+    </p:bg>
+    <p:spTree>
+      <p:nvGrpSpPr>
+        <p:cNvPr id="1" name="Shape 122"/>
+        <p:cNvGrpSpPr/>
+        <p:nvPr/>
+      </p:nvGrpSpPr>
+      <p:grpSpPr>
+        <a:xfrm>
+          <a:off x="0" y="0"/>
+          <a:ext cx="0" cy="0"/>
+          <a:chOff x="0" y="0"/>
+          <a:chExt cx="0" cy="0"/>
+        </a:xfrm>
+      </p:grpSpPr>
+      <p:pic>
+        <p:nvPicPr>
+          <p:cNvPr id="1026" name="Picture 2" descr="choose-modeling"/>
+          <p:cNvPicPr>
+            <a:picLocks noChangeAspect="1" noChangeArrowheads="1"/>
+          </p:cNvPicPr>
+          <p:nvPr/>
+        </p:nvPicPr>
+        <p:blipFill>
+          <a:blip r:embed="rId3">
+            <a:extLst>
+              <a:ext uri="{28A0092B-C50C-407E-A947-70E740481C1C}">
+                <a14:useLocalDpi xmlns:a14="http://schemas.microsoft.com/office/drawing/2010/main" val="0"/>
+              </a:ext>
+            </a:extLst>
+          </a:blip>
+          <a:srcRect/>
+          <a:stretch>
+            <a:fillRect/>
+          </a:stretch>
+        </p:blipFill>
+        <p:spPr bwMode="auto">
+          <a:xfrm>
+            <a:off x="1046120" y="235875"/>
+            <a:ext cx="6606630" cy="4685982"/>
+          </a:xfrm>
+          <a:prstGeom prst="rect">
+            <a:avLst/>
+          </a:prstGeom>
+          <a:noFill/>
+          <a:extLst>
+            <a:ext uri="{909E8E84-426E-40DD-AFC4-6F175D3DCCD1}">
+              <a14:hiddenFill xmlns:a14="http://schemas.microsoft.com/office/drawing/2010/main">
+                <a:solidFill>
+                  <a:srgbClr val="FFFFFF"/>
+                </a:solidFill>
+              </a14:hiddenFill>
+            </a:ext>
+          </a:extLst>
+        </p:spPr>
+      </p:pic>
+    </p:spTree>
+    <p:extLst>
+      <p:ext uri="{BB962C8B-B14F-4D97-AF65-F5344CB8AC3E}">
+        <p14:creationId xmlns:p14="http://schemas.microsoft.com/office/powerpoint/2010/main" val="3073504754"/>
+      </p:ext>
+    </p:extLst>
+  </p:cSld>
+  <p:clrMapOvr>
+    <a:masterClrMapping/>
+  </p:clrMapOvr>
+</p:sld>
+</file>
+
+<file path=ppt/slides/slide15.xml><?xml version="1.0" encoding="utf-8"?>
 <p:sld xmlns:a="http://schemas.openxmlformats.org/drawingml/2006/main" xmlns:r="http://schemas.openxmlformats.org/officeDocument/2006/relationships" xmlns:p="http://schemas.openxmlformats.org/presentationml/2006/main">
   <p:cSld>
     <p:bg>
@@ -6331,6 +7313,9 @@
             <a:pPr lvl="0"/>
             <a:r>
               <a:rPr lang="en" smtClean="0">
+                <a:solidFill>
+                  <a:srgbClr val="92D050"/>
+                </a:solidFill>
                 <a:effectLst>
                   <a:outerShdw blurRad="38100" dist="38100" dir="2700000" algn="tl">
                     <a:srgbClr val="000000">
@@ -6343,7 +7328,7 @@
             </a:r>
             <a:endParaRPr lang="en" sz="2400">
               <a:solidFill>
-                <a:srgbClr val="CDDC39"/>
+                <a:srgbClr val="92D050"/>
               </a:solidFill>
               <a:effectLst>
                 <a:outerShdw blurRad="38100" dist="38100" dir="2700000" algn="tl">
@@ -6451,7 +7436,7 @@
         </p:nvSpPr>
         <p:spPr>
           <a:xfrm>
-            <a:off x="5737447" y="875762"/>
+            <a:off x="5316027" y="875762"/>
             <a:ext cx="1434630" cy="3664045"/>
           </a:xfrm>
           <a:prstGeom prst="rect">
@@ -6844,21 +7829,6 @@
               </a:rPr>
               <a:t>Discuss ?</a:t>
             </a:r>
-            <a:endParaRPr lang="en-US" b="1" smtClean="0">
-              <a:solidFill>
-                <a:schemeClr val="bg1">
-                  <a:lumMod val="50000"/>
-                </a:schemeClr>
-              </a:solidFill>
-              <a:effectLst>
-                <a:outerShdw blurRad="38100" dist="38100" dir="2700000" algn="tl">
-                  <a:srgbClr val="000000">
-                    <a:alpha val="43137"/>
-                  </a:srgbClr>
-                </a:outerShdw>
-              </a:effectLst>
-              <a:latin typeface="Montserrat"/>
-            </a:endParaRPr>
           </a:p>
         </p:txBody>
       </p:sp>
@@ -6974,11 +7944,7 @@
             </a:r>
             <a:r>
               <a:rPr lang="vi-VN"/>
-              <a:t>Mapping </a:t>
-            </a:r>
-            <a:r>
-              <a:rPr lang="vi-VN"/>
-              <a:t>(</a:t>
+              <a:t>Mapping (</a:t>
             </a:r>
             <a:r>
               <a:rPr lang="vi-VN" b="1" smtClean="0"/>
@@ -7017,11 +7983,7 @@
             </a:r>
             <a:r>
               <a:rPr lang="vi-VN"/>
-              <a:t>đối tượng – </a:t>
-            </a:r>
-            <a:r>
-              <a:rPr lang="vi-VN"/>
-              <a:t>quan </a:t>
+              <a:t>đối tượng – quan </a:t>
             </a:r>
             <a:r>
               <a:rPr lang="vi-VN" smtClean="0"/>
@@ -8031,31 +8993,31 @@
               <a:buNone/>
             </a:pPr>
             <a:r>
+              <a:rPr lang="en-US" sz="1300" smtClean="0">
+                <a:solidFill>
+                  <a:srgbClr val="0000FF"/>
+                </a:solidFill>
+                <a:latin typeface="Courier New" pitchFamily="49" charset="0"/>
+                <a:ea typeface="Calibri" pitchFamily="34" charset="0"/>
+                <a:cs typeface="Courier New" pitchFamily="49" charset="0"/>
+              </a:rPr>
+              <a:t>			string</a:t>
+            </a:r>
+            <a:r>
+              <a:rPr lang="en-US" sz="1300" smtClean="0">
+                <a:latin typeface="Courier New" pitchFamily="49" charset="0"/>
+                <a:ea typeface="Calibri" pitchFamily="34" charset="0"/>
+                <a:cs typeface="Courier New" pitchFamily="49" charset="0"/>
+              </a:rPr>
+              <a:t> </a:t>
+            </a:r>
+            <a:r>
               <a:rPr lang="en-US" sz="1300">
                 <a:latin typeface="Courier New" pitchFamily="49" charset="0"/>
                 <a:ea typeface="Calibri" pitchFamily="34" charset="0"/>
                 <a:cs typeface="Courier New" pitchFamily="49" charset="0"/>
               </a:rPr>
-              <a:t>                        </a:t>
-            </a:r>
-            <a:r>
-              <a:rPr lang="en-US" sz="1300">
-                <a:solidFill>
-                  <a:srgbClr val="0000FF"/>
-                </a:solidFill>
-                <a:latin typeface="Courier New" pitchFamily="49" charset="0"/>
-                <a:ea typeface="Calibri" pitchFamily="34" charset="0"/>
-                <a:cs typeface="Courier New" pitchFamily="49" charset="0"/>
-              </a:rPr>
-              <a:t>string</a:t>
-            </a:r>
-            <a:r>
-              <a:rPr lang="en-US" sz="1300">
-                <a:latin typeface="Courier New" pitchFamily="49" charset="0"/>
-                <a:ea typeface="Calibri" pitchFamily="34" charset="0"/>
-                <a:cs typeface="Courier New" pitchFamily="49" charset="0"/>
-              </a:rPr>
-              <a:t> name = rdr.GetString(0);</a:t>
+              <a:t>name = rdr.GetString(0);</a:t>
             </a:r>
             <a:endParaRPr lang="en-US" sz="1300">
               <a:latin typeface="Arial" pitchFamily="34" charset="0"/>
@@ -8078,18 +9040,34 @@
                 <a:ea typeface="Calibri" pitchFamily="34" charset="0"/>
                 <a:cs typeface="Courier New" pitchFamily="49" charset="0"/>
               </a:rPr>
-              <a:t>                        </a:t>
-            </a:r>
-            <a:r>
-              <a:rPr lang="en-US" sz="1300">
-                <a:solidFill>
-                  <a:srgbClr val="0000FF"/>
-                </a:solidFill>
+              <a:t>                    </a:t>
+            </a:r>
+            <a:r>
+              <a:rPr lang="en-US" sz="1300" smtClean="0">
                 <a:latin typeface="Courier New" pitchFamily="49" charset="0"/>
                 <a:ea typeface="Calibri" pitchFamily="34" charset="0"/>
                 <a:cs typeface="Courier New" pitchFamily="49" charset="0"/>
               </a:rPr>
+              <a:t>	</a:t>
+            </a:r>
+            <a:r>
+              <a:rPr lang="en-US" sz="1300" smtClean="0">
+                <a:solidFill>
+                  <a:srgbClr val="0000FF"/>
+                </a:solidFill>
+                <a:latin typeface="Courier New" pitchFamily="49" charset="0"/>
+                <a:ea typeface="Calibri" pitchFamily="34" charset="0"/>
+                <a:cs typeface="Courier New" pitchFamily="49" charset="0"/>
+              </a:rPr>
               <a:t>string</a:t>
+            </a:r>
+            <a:r>
+              <a:rPr lang="en-US" sz="1300" smtClean="0">
+                <a:latin typeface="Courier New" pitchFamily="49" charset="0"/>
+                <a:ea typeface="Calibri" pitchFamily="34" charset="0"/>
+                <a:cs typeface="Courier New" pitchFamily="49" charset="0"/>
+              </a:rPr>
+              <a:t> </a:t>
             </a:r>
             <a:r>
               <a:rPr lang="en-US" sz="1300">
@@ -8097,7 +9075,7 @@
                 <a:ea typeface="Calibri" pitchFamily="34" charset="0"/>
                 <a:cs typeface="Courier New" pitchFamily="49" charset="0"/>
               </a:rPr>
-              <a:t> city = rdr.GetString(1);</a:t>
+              <a:t>city = rdr.GetString(1);</a:t>
             </a:r>
             <a:endParaRPr lang="en-US" sz="1300">
               <a:latin typeface="Arial" pitchFamily="34" charset="0"/>
@@ -8348,11 +9326,7 @@
             </a:r>
             <a:r>
               <a:rPr lang="vi-VN" sz="2200"/>
-              <a:t>các </a:t>
-            </a:r>
-            <a:r>
-              <a:rPr lang="vi-VN" sz="2200"/>
-              <a:t>hoạt </a:t>
+              <a:t>các hoạt </a:t>
             </a:r>
             <a:r>
               <a:rPr lang="vi-VN" sz="2200" smtClean="0"/>
@@ -8572,7 +9546,7 @@
                   </a:outerShdw>
                 </a:effectLst>
               </a:rPr>
-              <a:t>Models first</a:t>
+              <a:t>Model first</a:t>
             </a:r>
             <a:endParaRPr lang="vi-VN" smtClean="0"/>
           </a:p>
@@ -8700,11 +9674,7 @@
             </a:r>
             <a:r>
               <a:rPr lang="vi-VN"/>
-              <a:t>phương pháp chỉ nên dùng khi bạn đã có </a:t>
-            </a:r>
-            <a:r>
-              <a:rPr lang="vi-VN"/>
-              <a:t>sẵn </a:t>
+              <a:t>phương pháp chỉ nên dùng khi bạn đã có sẵn </a:t>
             </a:r>
             <a:endParaRPr lang="vi-VN" smtClean="0"/>
           </a:p>
@@ -8721,11 +9691,7 @@
             </a:r>
             <a:r>
               <a:rPr lang="vi-VN"/>
-              <a:t>, EF Wizard sẽ tạo Model </a:t>
-            </a:r>
-            <a:r>
-              <a:rPr lang="vi-VN"/>
-              <a:t>và </a:t>
+              <a:t>, EF Wizard sẽ tạo Model và </a:t>
             </a:r>
             <a:r>
               <a:rPr lang="vi-VN" smtClean="0"/>
@@ -8745,11 +9711,7 @@
             </a:r>
             <a:r>
               <a:rPr lang="vi-VN"/>
-              <a:t>EDMX từ database đã </a:t>
-            </a:r>
-            <a:r>
-              <a:rPr lang="vi-VN"/>
-              <a:t>có </a:t>
+              <a:t>EDMX từ database đã có </a:t>
             </a:r>
             <a:r>
               <a:rPr lang="vi-VN" smtClean="0"/>
@@ -8846,7 +9808,7 @@
           <a:lstStyle/>
           <a:p>
             <a:r>
-              <a:rPr lang="vi-VN">
+              <a:rPr lang="vi-VN" smtClean="0">
                 <a:solidFill>
                   <a:srgbClr val="92D050"/>
                 </a:solidFill>
@@ -8858,7 +9820,22 @@
                   </a:outerShdw>
                 </a:effectLst>
               </a:rPr>
-              <a:t>Models first</a:t>
+              <a:t>Model </a:t>
+            </a:r>
+            <a:r>
+              <a:rPr lang="vi-VN">
+                <a:solidFill>
+                  <a:srgbClr val="92D050"/>
+                </a:solidFill>
+                <a:effectLst>
+                  <a:outerShdw blurRad="38100" dist="38100" dir="2700000" algn="tl">
+                    <a:srgbClr val="000000">
+                      <a:alpha val="43137"/>
+                    </a:srgbClr>
+                  </a:outerShdw>
+                </a:effectLst>
+              </a:rPr>
+              <a:t>first</a:t>
             </a:r>
             <a:endParaRPr lang="vi-VN"/>
           </a:p>
@@ -8895,11 +9872,7 @@
             </a:r>
             <a:r>
               <a:rPr lang="vi-VN"/>
-              <a:t>khi bạn bắt đầu thiết kế CSDL </a:t>
-            </a:r>
-            <a:r>
-              <a:rPr lang="vi-VN"/>
-              <a:t>từ </a:t>
+              <a:t>khi bạn bắt đầu thiết kế CSDL từ </a:t>
             </a:r>
             <a:r>
               <a:rPr lang="vi-VN" smtClean="0"/>
@@ -8931,11 +9904,7 @@
             </a:r>
             <a:r>
               <a:rPr lang="en-US"/>
-              <a:t>, relationships, sau đó </a:t>
-            </a:r>
-            <a:r>
-              <a:rPr lang="en-US"/>
-              <a:t>generate </a:t>
+              <a:t>, relationships, sau đó generate </a:t>
             </a:r>
             <a:endParaRPr lang="en-US" smtClean="0"/>
           </a:p>

</xml_diff>